<commit_message>
Week 3 sorted and other minor changes (formatting etc)
</commit_message>
<xml_diff>
--- a/docs/lectures/Linearity and State Space.pptx
+++ b/docs/lectures/Linearity and State Space.pptx
@@ -212,7 +212,7 @@
           <a:p>
             <a:fld id="{6AD24EC9-7198-4B56-AEF9-BBEDF5640E20}" type="datetimeFigureOut">
               <a:rPr lang="en-GB" smtClean="0"/>
-              <a:t>07/10/2021</a:t>
+              <a:t>10/10/2021</a:t>
             </a:fld>
             <a:endParaRPr lang="en-GB"/>
           </a:p>
@@ -377,7 +377,7 @@
           <a:p>
             <a:fld id="{9DA14B43-C65A-4AE6-9D2C-F5DDC46BD098}" type="datetimeFigureOut">
               <a:rPr lang="en-GB" smtClean="0"/>
-              <a:t>07/10/2021</a:t>
+              <a:t>10/10/2021</a:t>
             </a:fld>
             <a:endParaRPr lang="en-GB"/>
           </a:p>
@@ -865,7 +865,7 @@
           <a:p>
             <a:fld id="{EADA9985-F9B8-4E11-8A40-B153142C5EE0}" type="datetimeFigureOut">
               <a:rPr lang="en-GB" smtClean="0"/>
-              <a:t>07/10/2021</a:t>
+              <a:t>10/10/2021</a:t>
             </a:fld>
             <a:endParaRPr lang="en-GB"/>
           </a:p>
@@ -1110,7 +1110,7 @@
           <a:p>
             <a:fld id="{EADA9985-F9B8-4E11-8A40-B153142C5EE0}" type="datetimeFigureOut">
               <a:rPr lang="en-GB" smtClean="0"/>
-              <a:t>07/10/2021</a:t>
+              <a:t>10/10/2021</a:t>
             </a:fld>
             <a:endParaRPr lang="en-GB"/>
           </a:p>
@@ -1290,7 +1290,7 @@
           <a:p>
             <a:fld id="{EADA9985-F9B8-4E11-8A40-B153142C5EE0}" type="datetimeFigureOut">
               <a:rPr lang="en-GB" smtClean="0"/>
-              <a:t>07/10/2021</a:t>
+              <a:t>10/10/2021</a:t>
             </a:fld>
             <a:endParaRPr lang="en-GB"/>
           </a:p>
@@ -1460,7 +1460,7 @@
           <a:p>
             <a:fld id="{EADA9985-F9B8-4E11-8A40-B153142C5EE0}" type="datetimeFigureOut">
               <a:rPr lang="en-GB" smtClean="0"/>
-              <a:t>07/10/2021</a:t>
+              <a:t>10/10/2021</a:t>
             </a:fld>
             <a:endParaRPr lang="en-GB"/>
           </a:p>
@@ -1742,7 +1742,7 @@
           <a:p>
             <a:fld id="{EADA9985-F9B8-4E11-8A40-B153142C5EE0}" type="datetimeFigureOut">
               <a:rPr lang="en-GB" smtClean="0"/>
-              <a:t>07/10/2021</a:t>
+              <a:t>10/10/2021</a:t>
             </a:fld>
             <a:endParaRPr lang="en-GB"/>
           </a:p>
@@ -1974,7 +1974,7 @@
           <a:p>
             <a:fld id="{EADA9985-F9B8-4E11-8A40-B153142C5EE0}" type="datetimeFigureOut">
               <a:rPr lang="en-GB" smtClean="0"/>
-              <a:t>07/10/2021</a:t>
+              <a:t>10/10/2021</a:t>
             </a:fld>
             <a:endParaRPr lang="en-GB"/>
           </a:p>
@@ -2341,7 +2341,7 @@
           <a:p>
             <a:fld id="{EADA9985-F9B8-4E11-8A40-B153142C5EE0}" type="datetimeFigureOut">
               <a:rPr lang="en-GB" smtClean="0"/>
-              <a:t>07/10/2021</a:t>
+              <a:t>10/10/2021</a:t>
             </a:fld>
             <a:endParaRPr lang="en-GB"/>
           </a:p>
@@ -2459,7 +2459,7 @@
           <a:p>
             <a:fld id="{EADA9985-F9B8-4E11-8A40-B153142C5EE0}" type="datetimeFigureOut">
               <a:rPr lang="en-GB" smtClean="0"/>
-              <a:t>07/10/2021</a:t>
+              <a:t>10/10/2021</a:t>
             </a:fld>
             <a:endParaRPr lang="en-GB"/>
           </a:p>
@@ -2554,7 +2554,7 @@
           <a:p>
             <a:fld id="{EADA9985-F9B8-4E11-8A40-B153142C5EE0}" type="datetimeFigureOut">
               <a:rPr lang="en-GB" smtClean="0"/>
-              <a:t>07/10/2021</a:t>
+              <a:t>10/10/2021</a:t>
             </a:fld>
             <a:endParaRPr lang="en-GB"/>
           </a:p>
@@ -2831,7 +2831,7 @@
           <a:p>
             <a:fld id="{EADA9985-F9B8-4E11-8A40-B153142C5EE0}" type="datetimeFigureOut">
               <a:rPr lang="en-GB" smtClean="0"/>
-              <a:t>07/10/2021</a:t>
+              <a:t>10/10/2021</a:t>
             </a:fld>
             <a:endParaRPr lang="en-GB"/>
           </a:p>
@@ -3084,7 +3084,7 @@
           <a:p>
             <a:fld id="{EADA9985-F9B8-4E11-8A40-B153142C5EE0}" type="datetimeFigureOut">
               <a:rPr lang="en-GB" smtClean="0"/>
-              <a:t>07/10/2021</a:t>
+              <a:t>10/10/2021</a:t>
             </a:fld>
             <a:endParaRPr lang="en-GB"/>
           </a:p>
@@ -3297,7 +3297,7 @@
           <a:p>
             <a:fld id="{EADA9985-F9B8-4E11-8A40-B153142C5EE0}" type="datetimeFigureOut">
               <a:rPr lang="en-GB" smtClean="0"/>
-              <a:t>07/10/2021</a:t>
+              <a:t>10/10/2021</a:t>
             </a:fld>
             <a:endParaRPr lang="en-GB"/>
           </a:p>
@@ -3783,7 +3783,7 @@
         </p:spPr>
         <p:txBody>
           <a:bodyPr vert="horz" lIns="91440" tIns="45720" rIns="91440" bIns="45720" rtlCol="0" anchor="t" anchorCtr="0">
-            <a:normAutofit fontScale="85000" lnSpcReduction="20000"/>
+            <a:normAutofit/>
           </a:bodyPr>
           <a:lstStyle>
             <a:lvl1pPr algn="ctr" defTabSz="914400" rtl="0" eaLnBrk="1" latinLnBrk="0" hangingPunct="1">
@@ -3805,12 +3805,13 @@
             </a:lvl1pPr>
           </a:lstStyle>
           <a:p>
-            <a:endParaRPr lang="en-GB" sz="4400" b="1" dirty="0"/>
-          </a:p>
-          <a:p>
+            <a:r>
+              <a:rPr lang="en-GB" sz="4400" b="1"/>
+              <a:t>Linearity </a:t>
+            </a:r>
             <a:r>
               <a:rPr lang="en-GB" sz="4400" b="1" dirty="0"/>
-              <a:t>Modelling and Simulation: Linearity and State Space</a:t>
+              <a:t>and State Space</a:t>
             </a:r>
           </a:p>
         </p:txBody>

</xml_diff>

<commit_message>
Section 4 and figure updates. State space simulation tutorial reconfiguration.
Updated
</commit_message>
<xml_diff>
--- a/docs/lectures/Linearity and State Space.pptx
+++ b/docs/lectures/Linearity and State Space.pptx
@@ -212,7 +212,7 @@
           <a:p>
             <a:fld id="{6AD24EC9-7198-4B56-AEF9-BBEDF5640E20}" type="datetimeFigureOut">
               <a:rPr lang="en-GB" smtClean="0"/>
-              <a:t>10/10/2021</a:t>
+              <a:t>12/10/2021</a:t>
             </a:fld>
             <a:endParaRPr lang="en-GB"/>
           </a:p>
@@ -377,7 +377,7 @@
           <a:p>
             <a:fld id="{9DA14B43-C65A-4AE6-9D2C-F5DDC46BD098}" type="datetimeFigureOut">
               <a:rPr lang="en-GB" smtClean="0"/>
-              <a:t>10/10/2021</a:t>
+              <a:t>12/10/2021</a:t>
             </a:fld>
             <a:endParaRPr lang="en-GB"/>
           </a:p>
@@ -865,7 +865,7 @@
           <a:p>
             <a:fld id="{EADA9985-F9B8-4E11-8A40-B153142C5EE0}" type="datetimeFigureOut">
               <a:rPr lang="en-GB" smtClean="0"/>
-              <a:t>10/10/2021</a:t>
+              <a:t>12/10/2021</a:t>
             </a:fld>
             <a:endParaRPr lang="en-GB"/>
           </a:p>
@@ -1110,7 +1110,7 @@
           <a:p>
             <a:fld id="{EADA9985-F9B8-4E11-8A40-B153142C5EE0}" type="datetimeFigureOut">
               <a:rPr lang="en-GB" smtClean="0"/>
-              <a:t>10/10/2021</a:t>
+              <a:t>12/10/2021</a:t>
             </a:fld>
             <a:endParaRPr lang="en-GB"/>
           </a:p>
@@ -1290,7 +1290,7 @@
           <a:p>
             <a:fld id="{EADA9985-F9B8-4E11-8A40-B153142C5EE0}" type="datetimeFigureOut">
               <a:rPr lang="en-GB" smtClean="0"/>
-              <a:t>10/10/2021</a:t>
+              <a:t>12/10/2021</a:t>
             </a:fld>
             <a:endParaRPr lang="en-GB"/>
           </a:p>
@@ -1460,7 +1460,7 @@
           <a:p>
             <a:fld id="{EADA9985-F9B8-4E11-8A40-B153142C5EE0}" type="datetimeFigureOut">
               <a:rPr lang="en-GB" smtClean="0"/>
-              <a:t>10/10/2021</a:t>
+              <a:t>12/10/2021</a:t>
             </a:fld>
             <a:endParaRPr lang="en-GB"/>
           </a:p>
@@ -1742,7 +1742,7 @@
           <a:p>
             <a:fld id="{EADA9985-F9B8-4E11-8A40-B153142C5EE0}" type="datetimeFigureOut">
               <a:rPr lang="en-GB" smtClean="0"/>
-              <a:t>10/10/2021</a:t>
+              <a:t>12/10/2021</a:t>
             </a:fld>
             <a:endParaRPr lang="en-GB"/>
           </a:p>
@@ -1974,7 +1974,7 @@
           <a:p>
             <a:fld id="{EADA9985-F9B8-4E11-8A40-B153142C5EE0}" type="datetimeFigureOut">
               <a:rPr lang="en-GB" smtClean="0"/>
-              <a:t>10/10/2021</a:t>
+              <a:t>12/10/2021</a:t>
             </a:fld>
             <a:endParaRPr lang="en-GB"/>
           </a:p>
@@ -2341,7 +2341,7 @@
           <a:p>
             <a:fld id="{EADA9985-F9B8-4E11-8A40-B153142C5EE0}" type="datetimeFigureOut">
               <a:rPr lang="en-GB" smtClean="0"/>
-              <a:t>10/10/2021</a:t>
+              <a:t>12/10/2021</a:t>
             </a:fld>
             <a:endParaRPr lang="en-GB"/>
           </a:p>
@@ -2459,7 +2459,7 @@
           <a:p>
             <a:fld id="{EADA9985-F9B8-4E11-8A40-B153142C5EE0}" type="datetimeFigureOut">
               <a:rPr lang="en-GB" smtClean="0"/>
-              <a:t>10/10/2021</a:t>
+              <a:t>12/10/2021</a:t>
             </a:fld>
             <a:endParaRPr lang="en-GB"/>
           </a:p>
@@ -2554,7 +2554,7 @@
           <a:p>
             <a:fld id="{EADA9985-F9B8-4E11-8A40-B153142C5EE0}" type="datetimeFigureOut">
               <a:rPr lang="en-GB" smtClean="0"/>
-              <a:t>10/10/2021</a:t>
+              <a:t>12/10/2021</a:t>
             </a:fld>
             <a:endParaRPr lang="en-GB"/>
           </a:p>
@@ -2831,7 +2831,7 @@
           <a:p>
             <a:fld id="{EADA9985-F9B8-4E11-8A40-B153142C5EE0}" type="datetimeFigureOut">
               <a:rPr lang="en-GB" smtClean="0"/>
-              <a:t>10/10/2021</a:t>
+              <a:t>12/10/2021</a:t>
             </a:fld>
             <a:endParaRPr lang="en-GB"/>
           </a:p>
@@ -3084,7 +3084,7 @@
           <a:p>
             <a:fld id="{EADA9985-F9B8-4E11-8A40-B153142C5EE0}" type="datetimeFigureOut">
               <a:rPr lang="en-GB" smtClean="0"/>
-              <a:t>10/10/2021</a:t>
+              <a:t>12/10/2021</a:t>
             </a:fld>
             <a:endParaRPr lang="en-GB"/>
           </a:p>
@@ -3297,7 +3297,7 @@
           <a:p>
             <a:fld id="{EADA9985-F9B8-4E11-8A40-B153142C5EE0}" type="datetimeFigureOut">
               <a:rPr lang="en-GB" smtClean="0"/>
-              <a:t>10/10/2021</a:t>
+              <a:t>12/10/2021</a:t>
             </a:fld>
             <a:endParaRPr lang="en-GB"/>
           </a:p>
@@ -3877,7 +3877,7 @@
           <a:p>
             <a:r>
               <a:rPr lang="en-US" b="1" dirty="0"/>
-              <a:t>State space representation</a:t>
+              <a:t>State Space representation</a:t>
             </a:r>
           </a:p>
         </p:txBody>
@@ -4452,8 +4452,8 @@
           </a:p>
         </p:txBody>
       </p:sp>
-      <mc:AlternateContent xmlns:mc="http://schemas.openxmlformats.org/markup-compatibility/2006" xmlns:a14="http://schemas.microsoft.com/office/drawing/2010/main">
-        <mc:Choice Requires="a14">
+      <mc:AlternateContent xmlns:mc="http://schemas.openxmlformats.org/markup-compatibility/2006">
+        <mc:Choice xmlns:a14="http://schemas.microsoft.com/office/drawing/2010/main" Requires="a14">
           <p:sp>
             <p:nvSpPr>
               <p:cNvPr id="3" name="Content Placeholder 2">
@@ -4478,7 +4478,7 @@
             </p:spPr>
             <p:txBody>
               <a:bodyPr>
-                <a:normAutofit lnSpcReduction="10000"/>
+                <a:normAutofit fontScale="92500"/>
               </a:bodyPr>
               <a:lstStyle/>
               <a:p>
@@ -4552,12 +4552,31 @@
                         </m:r>
                       </m:num>
                       <m:den>
-                        <m:r>
-                          <a:rPr lang="en-GB" b="0" i="1" smtClean="0">
-                            <a:latin typeface="Cambria Math" panose="02040503050406030204" pitchFamily="18" charset="0"/>
-                          </a:rPr>
-                          <m:t>𝐾</m:t>
-                        </m:r>
+                        <m:sSub>
+                          <m:sSubPr>
+                            <m:ctrlPr>
+                              <a:rPr lang="en-GB" b="0" i="1" smtClean="0">
+                                <a:latin typeface="Cambria Math" panose="02040503050406030204" pitchFamily="18" charset="0"/>
+                              </a:rPr>
+                            </m:ctrlPr>
+                          </m:sSubPr>
+                          <m:e>
+                            <m:r>
+                              <a:rPr lang="en-GB" b="0" i="1" smtClean="0">
+                                <a:latin typeface="Cambria Math" panose="02040503050406030204" pitchFamily="18" charset="0"/>
+                              </a:rPr>
+                              <m:t>𝐾</m:t>
+                            </m:r>
+                          </m:e>
+                          <m:sub>
+                            <m:r>
+                              <a:rPr lang="en-GB" b="0" i="1" smtClean="0">
+                                <a:latin typeface="Cambria Math" panose="02040503050406030204" pitchFamily="18" charset="0"/>
+                              </a:rPr>
+                              <m:t>𝑠</m:t>
+                            </m:r>
+                          </m:sub>
+                        </m:sSub>
                       </m:den>
                     </m:f>
                     <m:r>
@@ -4583,12 +4602,31 @@
                         </m:r>
                       </m:num>
                       <m:den>
-                        <m:r>
-                          <a:rPr lang="en-GB" b="0" i="1" smtClean="0">
-                            <a:latin typeface="Cambria Math" panose="02040503050406030204" pitchFamily="18" charset="0"/>
-                          </a:rPr>
-                          <m:t>𝐾</m:t>
-                        </m:r>
+                        <m:sSub>
+                          <m:sSubPr>
+                            <m:ctrlPr>
+                              <a:rPr lang="en-GB" b="0" i="1" smtClean="0">
+                                <a:latin typeface="Cambria Math" panose="02040503050406030204" pitchFamily="18" charset="0"/>
+                              </a:rPr>
+                            </m:ctrlPr>
+                          </m:sSubPr>
+                          <m:e>
+                            <m:r>
+                              <a:rPr lang="en-GB" b="0" i="1" smtClean="0">
+                                <a:latin typeface="Cambria Math" panose="02040503050406030204" pitchFamily="18" charset="0"/>
+                              </a:rPr>
+                              <m:t>𝐾</m:t>
+                            </m:r>
+                          </m:e>
+                          <m:sub>
+                            <m:r>
+                              <a:rPr lang="en-GB" b="0" i="1" smtClean="0">
+                                <a:latin typeface="Cambria Math" panose="02040503050406030204" pitchFamily="18" charset="0"/>
+                              </a:rPr>
+                              <m:t>𝑡</m:t>
+                            </m:r>
+                          </m:sub>
+                        </m:sSub>
                       </m:den>
                     </m:f>
                   </m:oMath>
@@ -5335,7 +5373,7 @@
             </p:txBody>
           </p:sp>
         </mc:Choice>
-        <mc:Fallback xmlns="">
+        <mc:Fallback>
           <p:sp>
             <p:nvSpPr>
               <p:cNvPr id="3" name="Content Placeholder 2">
@@ -5358,9 +5396,9 @@
                 <a:ext cx="6254858" cy="4677347"/>
               </a:xfrm>
               <a:blipFill>
-                <a:blip r:embed="rId5"/>
+                <a:blip r:embed="rId3"/>
                 <a:stretch>
-                  <a:fillRect l="-1619" b="-813"/>
+                  <a:fillRect l="-1417"/>
                 </a:stretch>
               </a:blipFill>
             </p:spPr>
@@ -5369,7 +5407,7 @@
               <a:lstStyle/>
               <a:p>
                 <a:r>
-                  <a:rPr lang="en-US">
+                  <a:rPr lang="en-GB">
                     <a:noFill/>
                   </a:rPr>
                   <a:t> </a:t>
@@ -5394,7 +5432,7 @@
           <p:nvPr/>
         </p:nvPicPr>
         <p:blipFill rotWithShape="1">
-          <a:blip r:embed="rId6"/>
+          <a:blip r:embed="rId4"/>
           <a:srcRect r="59964"/>
           <a:stretch/>
         </p:blipFill>
@@ -5938,8 +5976,8 @@
           </a:p>
         </p:txBody>
       </p:sp>
-      <mc:AlternateContent xmlns:mc="http://schemas.openxmlformats.org/markup-compatibility/2006" xmlns:a14="http://schemas.microsoft.com/office/drawing/2010/main">
-        <mc:Choice Requires="a14">
+      <mc:AlternateContent xmlns:mc="http://schemas.openxmlformats.org/markup-compatibility/2006">
+        <mc:Choice xmlns:a14="http://schemas.microsoft.com/office/drawing/2010/main" Requires="a14">
           <p:sp>
             <p:nvSpPr>
               <p:cNvPr id="3" name="Content Placeholder 2"/>
@@ -5964,7 +6002,7 @@
               <a:p>
                 <a:r>
                   <a:rPr lang="en-GB" sz="2400" dirty="0"/>
-                  <a:t>In mathematics a system is said to be linear if;</a:t>
+                  <a:t>In mathematics a system is said to be linear if*;</a:t>
                 </a:r>
               </a:p>
               <a:p>
@@ -6342,7 +6380,7 @@
             </p:txBody>
           </p:sp>
         </mc:Choice>
-        <mc:Fallback xmlns="">
+        <mc:Fallback>
           <p:sp>
             <p:nvSpPr>
               <p:cNvPr id="3" name="Content Placeholder 2"/>
@@ -6359,7 +6397,7 @@
                 <a:ext cx="7064023" cy="4623736"/>
               </a:xfrm>
               <a:blipFill>
-                <a:blip r:embed="rId4"/>
+                <a:blip r:embed="rId2"/>
                 <a:stretch>
                   <a:fillRect l="-1079" t="-2192" r="-1439"/>
                 </a:stretch>
@@ -6370,7 +6408,7 @@
               <a:lstStyle/>
               <a:p>
                 <a:r>
-                  <a:rPr lang="en-US">
+                  <a:rPr lang="en-GB">
                     <a:noFill/>
                   </a:rPr>
                   <a:t> </a:t>
@@ -6380,35 +6418,6 @@
           </p:sp>
         </mc:Fallback>
       </mc:AlternateContent>
-      <p:sp>
-        <p:nvSpPr>
-          <p:cNvPr id="5" name="Slide Number Placeholder 4"/>
-          <p:cNvSpPr>
-            <a:spLocks noGrp="1"/>
-          </p:cNvSpPr>
-          <p:nvPr>
-            <p:ph type="sldNum" sz="quarter" idx="4294967295"/>
-          </p:nvPr>
-        </p:nvSpPr>
-        <p:spPr>
-          <a:xfrm>
-            <a:off x="0" y="6356350"/>
-            <a:ext cx="4114800" cy="365125"/>
-          </a:xfrm>
-        </p:spPr>
-        <p:txBody>
-          <a:bodyPr/>
-          <a:lstStyle/>
-          <a:p>
-            <a:fld id="{878C1CCA-BE24-4F11-A262-F5F5CDF8E24D}" type="slidenum">
-              <a:rPr lang="en-GB" smtClean="0"/>
-              <a:pPr/>
-              <a:t>3</a:t>
-            </a:fld>
-            <a:endParaRPr lang="en-GB"/>
-          </a:p>
-        </p:txBody>
-      </p:sp>
       <p:sp>
         <p:nvSpPr>
           <p:cNvPr id="6" name="Title 1">
@@ -6478,7 +6487,7 @@
           <p:nvPr/>
         </p:nvPicPr>
         <p:blipFill>
-          <a:blip r:embed="rId5"/>
+          <a:blip r:embed="rId3"/>
           <a:stretch>
             <a:fillRect/>
           </a:stretch>
@@ -6508,7 +6517,7 @@
           <p:nvPr/>
         </p:nvPicPr>
         <p:blipFill>
-          <a:blip r:embed="rId6"/>
+          <a:blip r:embed="rId4"/>
           <a:stretch>
             <a:fillRect/>
           </a:stretch>
@@ -6595,6 +6604,47 @@
               <a:t>k+ax</a:t>
             </a:r>
             <a:endParaRPr lang="en-US" dirty="0"/>
+          </a:p>
+        </p:txBody>
+      </p:sp>
+      <p:sp>
+        <p:nvSpPr>
+          <p:cNvPr id="10" name="TextBox 9">
+            <a:extLst>
+              <a:ext uri="{FF2B5EF4-FFF2-40B4-BE49-F238E27FC236}">
+                <a16:creationId xmlns:a16="http://schemas.microsoft.com/office/drawing/2014/main" id="{174C0610-13C0-E945-805D-8822ED0F3D2B}"/>
+              </a:ext>
+            </a:extLst>
+          </p:cNvPr>
+          <p:cNvSpPr txBox="1"/>
+          <p:nvPr/>
+        </p:nvSpPr>
+        <p:spPr>
+          <a:xfrm>
+            <a:off x="269309" y="6102036"/>
+            <a:ext cx="7546297" cy="523220"/>
+          </a:xfrm>
+          <a:prstGeom prst="rect">
+            <a:avLst/>
+          </a:prstGeom>
+          <a:noFill/>
+        </p:spPr>
+        <p:txBody>
+          <a:bodyPr wrap="none" rtlCol="0">
+            <a:spAutoFit/>
+          </a:bodyPr>
+          <a:lstStyle/>
+          <a:p>
+            <a:r>
+              <a:rPr lang="en-GB" sz="1400" dirty="0"/>
+              <a:t>*the actual definition is a bit more technical and is written in terms of the principle of superposition, </a:t>
+            </a:r>
+          </a:p>
+          <a:p>
+            <a:r>
+              <a:rPr lang="en-GB" sz="1400" dirty="0"/>
+              <a:t>we will focus on linear systems so the exact definition doesn’t matter (but please look it up!)</a:t>
+            </a:r>
           </a:p>
         </p:txBody>
       </p:sp>
@@ -6705,7 +6755,15 @@
           <a:p>
             <a:r>
               <a:rPr lang="en-US" dirty="0"/>
-              <a:t>Most non-linear systems can be linearized (around a point) which provides a means of making some intractable nonlinear system problems tractable.</a:t>
+              <a:t>Most non-linear systems can be </a:t>
+            </a:r>
+            <a:r>
+              <a:rPr lang="en-US" dirty="0" err="1"/>
+              <a:t>linearised</a:t>
+            </a:r>
+            <a:r>
+              <a:rPr lang="en-US" dirty="0"/>
+              <a:t> (around a point) which provides a means of making some intractable nonlinear system problems tractable.</a:t>
             </a:r>
           </a:p>
         </p:txBody>
@@ -11551,8 +11609,8 @@
           </a:p>
         </p:txBody>
       </p:sp>
-      <mc:AlternateContent xmlns:mc="http://schemas.openxmlformats.org/markup-compatibility/2006" xmlns:a14="http://schemas.microsoft.com/office/drawing/2010/main">
-        <mc:Choice Requires="a14">
+      <mc:AlternateContent xmlns:mc="http://schemas.openxmlformats.org/markup-compatibility/2006">
+        <mc:Choice xmlns:a14="http://schemas.microsoft.com/office/drawing/2010/main" Requires="a14">
           <p:sp>
             <p:nvSpPr>
               <p:cNvPr id="3" name="Content Placeholder 2">
@@ -11576,7 +11634,7 @@
               <a:p>
                 <a:r>
                   <a:rPr lang="en-US" dirty="0"/>
-                  <a:t>The states don’t necessarily include information necessary for engineering purposes. </a:t>
+                  <a:t>The states don’t include information necessary for engineering purposes. </a:t>
                 </a:r>
               </a:p>
               <a:p>
@@ -12016,7 +12074,7 @@
             </p:txBody>
           </p:sp>
         </mc:Choice>
-        <mc:Fallback xmlns="">
+        <mc:Fallback>
           <p:sp>
             <p:nvSpPr>
               <p:cNvPr id="3" name="Content Placeholder 2">
@@ -12035,9 +12093,9 @@
             </p:nvSpPr>
             <p:spPr>
               <a:blipFill>
-                <a:blip r:embed="rId4"/>
+                <a:blip r:embed="rId2"/>
                 <a:stretch>
-                  <a:fillRect l="-1086" t="-2326"/>
+                  <a:fillRect l="-1086" t="-2326" r="-603"/>
                 </a:stretch>
               </a:blipFill>
             </p:spPr>
@@ -12046,7 +12104,7 @@
               <a:lstStyle/>
               <a:p>
                 <a:r>
-                  <a:rPr lang="en-US">
+                  <a:rPr lang="en-GB">
                     <a:noFill/>
                   </a:rPr>
                   <a:t> </a:t>
@@ -12110,12 +12168,7 @@
             <p:ph type="title"/>
           </p:nvPr>
         </p:nvSpPr>
-        <p:spPr>
-          <a:xfrm>
-            <a:off x="262003" y="0"/>
-            <a:ext cx="10515600" cy="1325563"/>
-          </a:xfrm>
-        </p:spPr>
+        <p:spPr/>
         <p:txBody>
           <a:bodyPr/>
           <a:lstStyle/>
@@ -12128,8 +12181,8 @@
           </a:p>
         </p:txBody>
       </p:sp>
-      <mc:AlternateContent xmlns:mc="http://schemas.openxmlformats.org/markup-compatibility/2006" xmlns:a14="http://schemas.microsoft.com/office/drawing/2010/main">
-        <mc:Choice Requires="a14">
+      <mc:AlternateContent xmlns:mc="http://schemas.openxmlformats.org/markup-compatibility/2006">
+        <mc:Choice xmlns:a14="http://schemas.microsoft.com/office/drawing/2010/main" Requires="a14">
           <p:sp>
             <p:nvSpPr>
               <p:cNvPr id="3" name="Content Placeholder 2">
@@ -12148,7 +12201,7 @@
             </p:nvSpPr>
             <p:spPr>
               <a:xfrm>
-                <a:off x="625258" y="987024"/>
+                <a:off x="838200" y="1654175"/>
                 <a:ext cx="10515600" cy="4351338"/>
               </a:xfrm>
             </p:spPr>
@@ -14171,7 +14224,7 @@
             </p:txBody>
           </p:sp>
         </mc:Choice>
-        <mc:Fallback xmlns="">
+        <mc:Fallback>
           <p:sp>
             <p:nvSpPr>
               <p:cNvPr id="3" name="Content Placeholder 2">
@@ -14190,13 +14243,13 @@
             </p:nvSpPr>
             <p:spPr>
               <a:xfrm>
-                <a:off x="625258" y="987024"/>
+                <a:off x="838200" y="1654175"/>
                 <a:ext cx="10515600" cy="4351338"/>
               </a:xfrm>
               <a:blipFill>
-                <a:blip r:embed="rId4"/>
+                <a:blip r:embed="rId2"/>
                 <a:stretch>
-                  <a:fillRect l="-965" t="-2035" b="-1453"/>
+                  <a:fillRect l="-965" t="-2332" b="-1458"/>
                 </a:stretch>
               </a:blipFill>
             </p:spPr>
@@ -14205,7 +14258,7 @@
               <a:lstStyle/>
               <a:p>
                 <a:r>
-                  <a:rPr lang="en-US">
+                  <a:rPr lang="en-GB">
                     <a:noFill/>
                   </a:rPr>
                   <a:t> </a:t>

</xml_diff>